<commit_message>
[EDIT] trelo = trello aangepast in presentatie
</commit_message>
<xml_diff>
--- a/Documenten/Project Managment/BCLW_Tussen_Presentatie_HOLOCAR.pptx
+++ b/Documenten/Project Managment/BCLW_Tussen_Presentatie_HOLOCAR.pptx
@@ -20,22 +20,22 @@
   <p:notesSz cx="6858000" cy="9144000"/>
   <p:embeddedFontLst>
     <p:embeddedFont>
-      <p:font typeface="Titillium Web" panose="020B0604020202020204" charset="0"/>
+      <p:font typeface="Titillium Web ExtraLight" panose="020B0604020202020204" charset="0"/>
       <p:regular r:id="rId10"/>
       <p:bold r:id="rId11"/>
       <p:italic r:id="rId12"/>
       <p:boldItalic r:id="rId13"/>
     </p:embeddedFont>
     <p:embeddedFont>
-      <p:font typeface="Titillium Web ExtraLight" panose="020B0604020202020204" charset="0"/>
-      <p:regular r:id="rId14"/>
-      <p:bold r:id="rId15"/>
-      <p:italic r:id="rId16"/>
-      <p:boldItalic r:id="rId17"/>
+      <p:font typeface="Titillium Web SemiBold" panose="020B0604020202020204" charset="0"/>
+      <p:bold r:id="rId14"/>
+      <p:boldItalic r:id="rId15"/>
     </p:embeddedFont>
     <p:embeddedFont>
-      <p:font typeface="Titillium Web SemiBold" panose="020B0604020202020204" charset="0"/>
-      <p:bold r:id="rId18"/>
+      <p:font typeface="Titillium Web" panose="020B0604020202020204" charset="0"/>
+      <p:regular r:id="rId16"/>
+      <p:bold r:id="rId17"/>
+      <p:italic r:id="rId18"/>
       <p:boldItalic r:id="rId19"/>
     </p:embeddedFont>
   </p:embeddedFontLst>
@@ -35739,7 +35739,7 @@
             </a:r>
             <a:r>
               <a:rPr lang="nl-NL" dirty="0" err="1"/>
-              <a:t>Trelo</a:t>
+              <a:t>Trello</a:t>
             </a:r>
             <a:r>
               <a:rPr lang="nl-NL" dirty="0"/>

</xml_diff>